<commit_message>
Link for MSBuild updated
</commit_message>
<xml_diff>
--- a/Documents/Quickstart-Dev-VS2017.pptx
+++ b/Documents/Quickstart-Dev-VS2017.pptx
@@ -118,6 +118,11 @@
       </a:defRPr>
     </a:lvl9pPr>
   </p:defaultTextStyle>
+  <p:extLst>
+    <p:ext uri="{EFAFB233-063F-42B5-8137-9DF3F51BA10A}">
+      <p15:sldGuideLst xmlns:p15="http://schemas.microsoft.com/office/powerpoint/2012/main"/>
+    </p:ext>
+  </p:extLst>
 </p:presentation>
 </file>
 
@@ -252,7 +257,7 @@
           <a:p>
             <a:fld id="{B7AACD98-87E8-4500-A274-2FB34478FF8B}" type="datetimeFigureOut">
               <a:rPr lang="de-DE" smtClean="0"/>
-              <a:t>17.03.2017</a:t>
+              <a:t>06.06.2017</a:t>
             </a:fld>
             <a:endParaRPr lang="de-DE"/>
           </a:p>
@@ -422,7 +427,7 @@
           <a:p>
             <a:fld id="{B7AACD98-87E8-4500-A274-2FB34478FF8B}" type="datetimeFigureOut">
               <a:rPr lang="de-DE" smtClean="0"/>
-              <a:t>17.03.2017</a:t>
+              <a:t>06.06.2017</a:t>
             </a:fld>
             <a:endParaRPr lang="de-DE"/>
           </a:p>
@@ -602,7 +607,7 @@
           <a:p>
             <a:fld id="{B7AACD98-87E8-4500-A274-2FB34478FF8B}" type="datetimeFigureOut">
               <a:rPr lang="de-DE" smtClean="0"/>
-              <a:t>17.03.2017</a:t>
+              <a:t>06.06.2017</a:t>
             </a:fld>
             <a:endParaRPr lang="de-DE"/>
           </a:p>
@@ -772,7 +777,7 @@
           <a:p>
             <a:fld id="{B7AACD98-87E8-4500-A274-2FB34478FF8B}" type="datetimeFigureOut">
               <a:rPr lang="de-DE" smtClean="0"/>
-              <a:t>17.03.2017</a:t>
+              <a:t>06.06.2017</a:t>
             </a:fld>
             <a:endParaRPr lang="de-DE"/>
           </a:p>
@@ -1016,7 +1021,7 @@
           <a:p>
             <a:fld id="{B7AACD98-87E8-4500-A274-2FB34478FF8B}" type="datetimeFigureOut">
               <a:rPr lang="de-DE" smtClean="0"/>
-              <a:t>17.03.2017</a:t>
+              <a:t>06.06.2017</a:t>
             </a:fld>
             <a:endParaRPr lang="de-DE"/>
           </a:p>
@@ -1248,7 +1253,7 @@
           <a:p>
             <a:fld id="{B7AACD98-87E8-4500-A274-2FB34478FF8B}" type="datetimeFigureOut">
               <a:rPr lang="de-DE" smtClean="0"/>
-              <a:t>17.03.2017</a:t>
+              <a:t>06.06.2017</a:t>
             </a:fld>
             <a:endParaRPr lang="de-DE"/>
           </a:p>
@@ -1615,7 +1620,7 @@
           <a:p>
             <a:fld id="{B7AACD98-87E8-4500-A274-2FB34478FF8B}" type="datetimeFigureOut">
               <a:rPr lang="de-DE" smtClean="0"/>
-              <a:t>17.03.2017</a:t>
+              <a:t>06.06.2017</a:t>
             </a:fld>
             <a:endParaRPr lang="de-DE"/>
           </a:p>
@@ -1733,7 +1738,7 @@
           <a:p>
             <a:fld id="{B7AACD98-87E8-4500-A274-2FB34478FF8B}" type="datetimeFigureOut">
               <a:rPr lang="de-DE" smtClean="0"/>
-              <a:t>17.03.2017</a:t>
+              <a:t>06.06.2017</a:t>
             </a:fld>
             <a:endParaRPr lang="de-DE"/>
           </a:p>
@@ -1828,7 +1833,7 @@
           <a:p>
             <a:fld id="{B7AACD98-87E8-4500-A274-2FB34478FF8B}" type="datetimeFigureOut">
               <a:rPr lang="de-DE" smtClean="0"/>
-              <a:t>17.03.2017</a:t>
+              <a:t>06.06.2017</a:t>
             </a:fld>
             <a:endParaRPr lang="de-DE"/>
           </a:p>
@@ -2105,7 +2110,7 @@
           <a:p>
             <a:fld id="{B7AACD98-87E8-4500-A274-2FB34478FF8B}" type="datetimeFigureOut">
               <a:rPr lang="de-DE" smtClean="0"/>
-              <a:t>17.03.2017</a:t>
+              <a:t>06.06.2017</a:t>
             </a:fld>
             <a:endParaRPr lang="de-DE"/>
           </a:p>
@@ -2362,7 +2367,7 @@
           <a:p>
             <a:fld id="{B7AACD98-87E8-4500-A274-2FB34478FF8B}" type="datetimeFigureOut">
               <a:rPr lang="de-DE" smtClean="0"/>
-              <a:t>17.03.2017</a:t>
+              <a:t>06.06.2017</a:t>
             </a:fld>
             <a:endParaRPr lang="de-DE"/>
           </a:p>
@@ -2575,7 +2580,7 @@
           <a:p>
             <a:fld id="{B7AACD98-87E8-4500-A274-2FB34478FF8B}" type="datetimeFigureOut">
               <a:rPr lang="de-DE" smtClean="0"/>
-              <a:t>17.03.2017</a:t>
+              <a:t>06.06.2017</a:t>
             </a:fld>
             <a:endParaRPr lang="de-DE"/>
           </a:p>
@@ -4783,7 +4788,6 @@
               <a:rPr lang="de-DE" dirty="0"/>
               <a:t> „Output“</a:t>
             </a:r>
-            <a:endParaRPr lang="de-DE" dirty="0"/>
           </a:p>
         </p:txBody>
       </p:sp>
@@ -5594,7 +5598,7 @@
         </p:spPr>
         <p:txBody>
           <a:bodyPr>
-            <a:normAutofit fontScale="85000" lnSpcReduction="20000"/>
+            <a:normAutofit fontScale="47500" lnSpcReduction="20000"/>
           </a:bodyPr>
           <a:lstStyle/>
           <a:p>
@@ -5692,8 +5696,57 @@
             </a:r>
             <a:r>
               <a:rPr lang="de-DE" dirty="0"/>
-              <a:t> VS 2015)</a:t>
-            </a:r>
+              <a:t> VS 2015</a:t>
+            </a:r>
+            <a:r>
+              <a:rPr lang="de-DE" dirty="0" smtClean="0"/>
+              <a:t>)</a:t>
+            </a:r>
+          </a:p>
+          <a:p>
+            <a:r>
+              <a:rPr lang="de-DE" dirty="0" err="1" smtClean="0"/>
+              <a:t>Alternatively</a:t>
+            </a:r>
+            <a:r>
+              <a:rPr lang="de-DE" dirty="0" smtClean="0"/>
+              <a:t>, </a:t>
+            </a:r>
+            <a:r>
+              <a:rPr lang="de-DE" dirty="0" err="1" smtClean="0"/>
+              <a:t>use</a:t>
+            </a:r>
+            <a:r>
+              <a:rPr lang="de-DE" dirty="0" smtClean="0"/>
+              <a:t> </a:t>
+            </a:r>
+            <a:r>
+              <a:rPr lang="de-DE" dirty="0" err="1" smtClean="0"/>
+              <a:t>direct</a:t>
+            </a:r>
+            <a:r>
+              <a:rPr lang="de-DE" dirty="0"/>
+              <a:t> link </a:t>
+            </a:r>
+            <a:r>
+              <a:rPr lang="de-DE" dirty="0">
+                <a:hlinkClick r:id="rId3"/>
+              </a:rPr>
+              <a:t>http</a:t>
+            </a:r>
+            <a:r>
+              <a:rPr lang="de-DE">
+                <a:hlinkClick r:id="rId3"/>
+              </a:rPr>
+              <a:t>://</a:t>
+            </a:r>
+            <a:r>
+              <a:rPr lang="de-DE" smtClean="0">
+                <a:hlinkClick r:id="rId3"/>
+              </a:rPr>
+              <a:t>download.microsoft.com/download/4/3/3/4330912d-79ae-4037-8a55-7a8fc6b5eb68/buildtools_full.exe</a:t>
+            </a:r>
+            <a:endParaRPr lang="de-DE" dirty="0"/>
           </a:p>
           <a:p>
             <a:endParaRPr lang="de-DE" dirty="0"/>
@@ -5709,7 +5762,7 @@
           <p:nvPr/>
         </p:nvPicPr>
         <p:blipFill>
-          <a:blip r:embed="rId3"/>
+          <a:blip r:embed="rId4"/>
           <a:stretch>
             <a:fillRect/>
           </a:stretch>

</xml_diff>